<commit_message>
added links and twitter contact
</commit_message>
<xml_diff>
--- a/decode2018_cosmosdb.pptx
+++ b/decode2018_cosmosdb.pptx
@@ -5,10 +5,10 @@
     <p:sldMasterId id="2147484382" r:id="rId4"/>
   </p:sldMasterIdLst>
   <p:notesMasterIdLst>
-    <p:notesMasterId r:id="rId31"/>
+    <p:notesMasterId r:id="rId33"/>
   </p:notesMasterIdLst>
   <p:handoutMasterIdLst>
-    <p:handoutMasterId r:id="rId32"/>
+    <p:handoutMasterId r:id="rId34"/>
   </p:handoutMasterIdLst>
   <p:sldIdLst>
     <p:sldId id="1450" r:id="rId5"/>
@@ -36,7 +36,9 @@
     <p:sldId id="1501" r:id="rId27"/>
     <p:sldId id="1502" r:id="rId28"/>
     <p:sldId id="1503" r:id="rId29"/>
-    <p:sldId id="1326" r:id="rId30"/>
+    <p:sldId id="1505" r:id="rId30"/>
+    <p:sldId id="1506" r:id="rId31"/>
+    <p:sldId id="1504" r:id="rId32"/>
   </p:sldIdLst>
   <p:sldSz cx="12436475" cy="6994525"/>
   <p:notesSz cx="6858000" cy="9144000"/>
@@ -256,7 +258,7 @@
               <a:rPr lang="en-US" smtClean="0">
                 <a:latin typeface="Segoe UI" pitchFamily="34" charset="0"/>
               </a:rPr>
-              <a:t>5/24/18 11:52 AM</a:t>
+              <a:t>5/24/18 12:41 PM</a:t>
             </a:fld>
             <a:endParaRPr lang="en-US" dirty="0">
               <a:latin typeface="Segoe UI" pitchFamily="34" charset="0"/>
@@ -501,7 +503,7 @@
           <a:p>
             <a:fld id="{38EEC551-8CDA-4EB6-89BB-2A86C9F091C8}" type="datetime8">
               <a:rPr lang="en-US" smtClean="0"/>
-              <a:t>5/24/18 11:52 AM</a:t>
+              <a:t>5/24/18 12:41 PM</a:t>
             </a:fld>
             <a:endParaRPr lang="en-US" dirty="0"/>
           </a:p>
@@ -876,7 +878,7 @@
           <a:p>
             <a:fld id="{7D10C09F-FCA1-48C8-B40D-42E1045D109E}" type="datetime8">
               <a:rPr lang="en-US" smtClean="0"/>
-              <a:t>5/24/18 11:52 AM</a:t>
+              <a:t>5/24/18 12:41 PM</a:t>
             </a:fld>
             <a:endParaRPr lang="en-US" dirty="0"/>
           </a:p>
@@ -1049,7 +1051,7 @@
           <a:p>
             <a:fld id="{7D10C09F-FCA1-48C8-B40D-42E1045D109E}" type="datetime8">
               <a:rPr lang="en-US" smtClean="0"/>
-              <a:t>5/24/18 11:52 AM</a:t>
+              <a:t>5/24/18 12:41 PM</a:t>
             </a:fld>
             <a:endParaRPr lang="en-US" dirty="0"/>
           </a:p>
@@ -1222,7 +1224,7 @@
           <a:p>
             <a:fld id="{7D10C09F-FCA1-48C8-B40D-42E1045D109E}" type="datetime8">
               <a:rPr lang="en-US" smtClean="0"/>
-              <a:t>5/24/18 11:52 AM</a:t>
+              <a:t>5/24/18 12:41 PM</a:t>
             </a:fld>
             <a:endParaRPr lang="en-US" dirty="0"/>
           </a:p>
@@ -1395,7 +1397,7 @@
           <a:p>
             <a:fld id="{7D10C09F-FCA1-48C8-B40D-42E1045D109E}" type="datetime8">
               <a:rPr lang="en-US" smtClean="0"/>
-              <a:t>5/24/18 11:52 AM</a:t>
+              <a:t>5/24/18 12:41 PM</a:t>
             </a:fld>
             <a:endParaRPr lang="en-US" dirty="0"/>
           </a:p>
@@ -1568,7 +1570,7 @@
           <a:p>
             <a:fld id="{7D10C09F-FCA1-48C8-B40D-42E1045D109E}" type="datetime8">
               <a:rPr lang="en-US" smtClean="0"/>
-              <a:t>5/24/18 11:54 AM</a:t>
+              <a:t>5/24/18 12:41 PM</a:t>
             </a:fld>
             <a:endParaRPr lang="en-US" dirty="0"/>
           </a:p>
@@ -1612,6 +1614,179 @@
 </file>
 
 <file path=ppt/notesSlides/notesSlide6.xml><?xml version="1.0" encoding="utf-8"?>
+<p:notes xmlns:a="http://schemas.openxmlformats.org/drawingml/2006/main" xmlns:r="http://schemas.openxmlformats.org/officeDocument/2006/relationships" xmlns:p="http://schemas.openxmlformats.org/presentationml/2006/main">
+  <p:cSld>
+    <p:spTree>
+      <p:nvGrpSpPr>
+        <p:cNvPr id="1" name=""/>
+        <p:cNvGrpSpPr/>
+        <p:nvPr/>
+      </p:nvGrpSpPr>
+      <p:grpSpPr>
+        <a:xfrm>
+          <a:off x="0" y="0"/>
+          <a:ext cx="0" cy="0"/>
+          <a:chOff x="0" y="0"/>
+          <a:chExt cx="0" cy="0"/>
+        </a:xfrm>
+      </p:grpSpPr>
+      <p:sp>
+        <p:nvSpPr>
+          <p:cNvPr id="2" name="Slide Image Placeholder 1"/>
+          <p:cNvSpPr>
+            <a:spLocks noGrp="1" noRot="1" noChangeAspect="1"/>
+          </p:cNvSpPr>
+          <p:nvPr>
+            <p:ph type="sldImg"/>
+          </p:nvPr>
+        </p:nvSpPr>
+        <p:spPr/>
+      </p:sp>
+      <p:sp>
+        <p:nvSpPr>
+          <p:cNvPr id="3" name="Notes Placeholder 2"/>
+          <p:cNvSpPr>
+            <a:spLocks noGrp="1"/>
+          </p:cNvSpPr>
+          <p:nvPr>
+            <p:ph type="body" idx="1"/>
+          </p:nvPr>
+        </p:nvSpPr>
+        <p:spPr/>
+        <p:txBody>
+          <a:bodyPr/>
+          <a:lstStyle/>
+          <a:p>
+            <a:endParaRPr lang="en-US" dirty="0"/>
+          </a:p>
+        </p:txBody>
+      </p:sp>
+      <p:sp>
+        <p:nvSpPr>
+          <p:cNvPr id="4" name="Header Placeholder 3"/>
+          <p:cNvSpPr>
+            <a:spLocks noGrp="1"/>
+          </p:cNvSpPr>
+          <p:nvPr>
+            <p:ph type="hdr" sz="quarter" idx="10"/>
+          </p:nvPr>
+        </p:nvSpPr>
+        <p:spPr>
+          <a:xfrm>
+            <a:off x="0" y="0"/>
+            <a:ext cx="2971800" cy="457200"/>
+          </a:xfrm>
+          <a:prstGeom prst="rect">
+            <a:avLst/>
+          </a:prstGeom>
+        </p:spPr>
+        <p:txBody>
+          <a:bodyPr/>
+          <a:lstStyle/>
+          <a:p>
+            <a:endParaRPr lang="en-US" dirty="0"/>
+          </a:p>
+        </p:txBody>
+      </p:sp>
+      <p:sp>
+        <p:nvSpPr>
+          <p:cNvPr id="5" name="Footer Placeholder 4"/>
+          <p:cNvSpPr>
+            <a:spLocks noGrp="1"/>
+          </p:cNvSpPr>
+          <p:nvPr>
+            <p:ph type="ftr" sz="quarter" idx="11"/>
+          </p:nvPr>
+        </p:nvSpPr>
+        <p:spPr/>
+        <p:txBody>
+          <a:bodyPr/>
+          <a:lstStyle/>
+          <a:p>
+            <a:pPr defTabSz="914099" eaLnBrk="0" hangingPunct="0"/>
+            <a:r>
+              <a:rPr lang="en-US" sz="400" dirty="0">
+                <a:gradFill>
+                  <a:gsLst>
+                    <a:gs pos="0">
+                      <a:prstClr val="black"/>
+                    </a:gs>
+                    <a:gs pos="100000">
+                      <a:prstClr val="black"/>
+                    </a:gs>
+                  </a:gsLst>
+                  <a:lin ang="5400000" scaled="0"/>
+                </a:gradFill>
+                <a:latin typeface="Segoe UI" pitchFamily="34" charset="0"/>
+                <a:ea typeface="Segoe UI" pitchFamily="34" charset="0"/>
+                <a:cs typeface="Segoe UI" pitchFamily="34" charset="0"/>
+              </a:rPr>
+              <a:t>© 2016 Microsoft Corporation. All rights reserved. MICROSOFT MAKES NO WARRANTIES, EXPRESS, IMPLIED OR STATUTORY, AS TO THE INFORMATION IN THIS PRESENTATION.</a:t>
+            </a:r>
+          </a:p>
+        </p:txBody>
+      </p:sp>
+      <p:sp>
+        <p:nvSpPr>
+          <p:cNvPr id="6" name="Date Placeholder 5"/>
+          <p:cNvSpPr>
+            <a:spLocks noGrp="1"/>
+          </p:cNvSpPr>
+          <p:nvPr>
+            <p:ph type="dt" idx="12"/>
+          </p:nvPr>
+        </p:nvSpPr>
+        <p:spPr/>
+        <p:txBody>
+          <a:bodyPr/>
+          <a:lstStyle/>
+          <a:p>
+            <a:fld id="{7D10C09F-FCA1-48C8-B40D-42E1045D109E}" type="datetime8">
+              <a:rPr lang="en-US" smtClean="0"/>
+              <a:t>5/24/18 12:42 PM</a:t>
+            </a:fld>
+            <a:endParaRPr lang="en-US" dirty="0"/>
+          </a:p>
+        </p:txBody>
+      </p:sp>
+      <p:sp>
+        <p:nvSpPr>
+          <p:cNvPr id="7" name="Slide Number Placeholder 6"/>
+          <p:cNvSpPr>
+            <a:spLocks noGrp="1"/>
+          </p:cNvSpPr>
+          <p:nvPr>
+            <p:ph type="sldNum" sz="quarter" idx="13"/>
+          </p:nvPr>
+        </p:nvSpPr>
+        <p:spPr/>
+        <p:txBody>
+          <a:bodyPr/>
+          <a:lstStyle/>
+          <a:p>
+            <a:fld id="{B4008EB6-D09E-4580-8CD6-DDB14511944F}" type="slidenum">
+              <a:rPr lang="en-US" smtClean="0"/>
+              <a:pPr/>
+              <a:t>26</a:t>
+            </a:fld>
+            <a:endParaRPr lang="en-US" dirty="0"/>
+          </a:p>
+        </p:txBody>
+      </p:sp>
+    </p:spTree>
+    <p:extLst>
+      <p:ext uri="{BB962C8B-B14F-4D97-AF65-F5344CB8AC3E}">
+        <p14:creationId xmlns:p14="http://schemas.microsoft.com/office/powerpoint/2010/main" val="741314019"/>
+      </p:ext>
+    </p:extLst>
+  </p:cSld>
+  <p:clrMapOvr>
+    <a:masterClrMapping/>
+  </p:clrMapOvr>
+</p:notes>
+</file>
+
+<file path=ppt/notesSlides/notesSlide7.xml><?xml version="1.0" encoding="utf-8"?>
 <p:notes xmlns:a="http://schemas.openxmlformats.org/drawingml/2006/main" xmlns:r="http://schemas.openxmlformats.org/officeDocument/2006/relationships" xmlns:p="http://schemas.openxmlformats.org/presentationml/2006/main">
   <p:cSld>
     <p:spTree>
@@ -1718,7 +1893,7 @@
                   <a:prstClr val="black"/>
                 </a:solidFill>
               </a:rPr>
-              <a:t>5/24/18 11:52 AM</a:t>
+              <a:t>5/24/18 12:42 PM</a:t>
             </a:fld>
             <a:endParaRPr lang="en-US" dirty="0">
               <a:solidFill>
@@ -1750,7 +1925,7 @@
                 </a:solidFill>
               </a:rPr>
               <a:pPr/>
-              <a:t>26</a:t>
+              <a:t>28</a:t>
             </a:fld>
             <a:endParaRPr lang="en-US" dirty="0">
               <a:solidFill>
@@ -1801,7 +1976,7 @@
     </p:spTree>
     <p:extLst>
       <p:ext uri="{BB962C8B-B14F-4D97-AF65-F5344CB8AC3E}">
-        <p14:creationId xmlns:p14="http://schemas.microsoft.com/office/powerpoint/2010/main" val="2861498552"/>
+        <p14:creationId xmlns:p14="http://schemas.microsoft.com/office/powerpoint/2010/main" val="2041728271"/>
       </p:ext>
     </p:extLst>
   </p:cSld>
@@ -7959,12 +8134,18 @@
           <a:lstStyle/>
           <a:p>
             <a:r>
-              <a:rPr lang="en-US" altLang="ja-JP"/>
-              <a:t>Principal Software </a:t>
-            </a:r>
-            <a:r>
               <a:rPr lang="en-US" altLang="ja-JP" dirty="0"/>
-              <a:t>Engineer, Microsoft</a:t>
+              <a:t>Principal Software Engineer, Microsoft</a:t>
+            </a:r>
+          </a:p>
+          <a:p>
+            <a:r>
+              <a:rPr kumimoji="1" lang="en-US" altLang="ja-JP" dirty="0"/>
+              <a:t>Twitter: @</a:t>
+            </a:r>
+            <a:r>
+              <a:rPr kumimoji="1" lang="en-US" altLang="ja-JP" dirty="0" err="1"/>
+              <a:t>dmakogon</a:t>
             </a:r>
             <a:endParaRPr kumimoji="1" lang="ja-JP" altLang="en-US"/>
           </a:p>
@@ -13209,10 +13390,278 @@
           <a:chExt cx="0" cy="0"/>
         </a:xfrm>
       </p:grpSpPr>
+      <p:sp>
+        <p:nvSpPr>
+          <p:cNvPr id="3" name="タイトル 2">
+            <a:extLst>
+              <a:ext uri="{FF2B5EF4-FFF2-40B4-BE49-F238E27FC236}">
+                <a16:creationId xmlns:a16="http://schemas.microsoft.com/office/drawing/2014/main" id="{9320925D-4773-4DB4-A02C-A255D05A5139}"/>
+              </a:ext>
+            </a:extLst>
+          </p:cNvPr>
+          <p:cNvSpPr>
+            <a:spLocks noGrp="1"/>
+          </p:cNvSpPr>
+          <p:nvPr>
+            <p:ph type="title"/>
+          </p:nvPr>
+        </p:nvSpPr>
+        <p:spPr/>
+        <p:txBody>
+          <a:bodyPr/>
+          <a:lstStyle/>
+          <a:p>
+            <a:r>
+              <a:rPr kumimoji="1" lang="en-US" altLang="ja-JP" dirty="0"/>
+              <a:t>Wrap-up</a:t>
+            </a:r>
+            <a:endParaRPr kumimoji="1" lang="ja-JP" altLang="en-US" dirty="0"/>
+          </a:p>
+        </p:txBody>
+      </p:sp>
     </p:spTree>
     <p:extLst>
       <p:ext uri="{BB962C8B-B14F-4D97-AF65-F5344CB8AC3E}">
-        <p14:creationId xmlns:p14="http://schemas.microsoft.com/office/powerpoint/2010/main" val="1066074585"/>
+        <p14:creationId xmlns:p14="http://schemas.microsoft.com/office/powerpoint/2010/main" val="2006924639"/>
+      </p:ext>
+    </p:extLst>
+  </p:cSld>
+  <p:clrMapOvr>
+    <a:masterClrMapping/>
+  </p:clrMapOvr>
+  <p:transition>
+    <p:fade/>
+  </p:transition>
+</p:sld>
+</file>
+
+<file path=ppt/slides/slide27.xml><?xml version="1.0" encoding="utf-8"?>
+<p:sld xmlns:a="http://schemas.openxmlformats.org/drawingml/2006/main" xmlns:r="http://schemas.openxmlformats.org/officeDocument/2006/relationships" xmlns:p="http://schemas.openxmlformats.org/presentationml/2006/main">
+  <p:cSld>
+    <p:spTree>
+      <p:nvGrpSpPr>
+        <p:cNvPr id="1" name=""/>
+        <p:cNvGrpSpPr/>
+        <p:nvPr/>
+      </p:nvGrpSpPr>
+      <p:grpSpPr>
+        <a:xfrm>
+          <a:off x="0" y="0"/>
+          <a:ext cx="0" cy="0"/>
+          <a:chOff x="0" y="0"/>
+          <a:chExt cx="0" cy="0"/>
+        </a:xfrm>
+      </p:grpSpPr>
+      <p:sp>
+        <p:nvSpPr>
+          <p:cNvPr id="2" name="タイトル 1">
+            <a:extLst>
+              <a:ext uri="{FF2B5EF4-FFF2-40B4-BE49-F238E27FC236}">
+                <a16:creationId xmlns:a16="http://schemas.microsoft.com/office/drawing/2014/main" id="{5A95598C-43C6-4FC3-A65A-7DB9427D39FD}"/>
+              </a:ext>
+            </a:extLst>
+          </p:cNvPr>
+          <p:cNvSpPr>
+            <a:spLocks noGrp="1"/>
+          </p:cNvSpPr>
+          <p:nvPr>
+            <p:ph type="title"/>
+          </p:nvPr>
+        </p:nvSpPr>
+        <p:spPr/>
+        <p:txBody>
+          <a:bodyPr/>
+          <a:lstStyle/>
+          <a:p>
+            <a:r>
+              <a:rPr kumimoji="1" lang="en-US" altLang="ja-JP" dirty="0"/>
+              <a:t>Where is everything?</a:t>
+            </a:r>
+            <a:endParaRPr kumimoji="1" lang="ja-JP" altLang="en-US" dirty="0"/>
+          </a:p>
+        </p:txBody>
+      </p:sp>
+      <p:sp>
+        <p:nvSpPr>
+          <p:cNvPr id="3" name="テキスト プレースホルダー 2">
+            <a:extLst>
+              <a:ext uri="{FF2B5EF4-FFF2-40B4-BE49-F238E27FC236}">
+                <a16:creationId xmlns:a16="http://schemas.microsoft.com/office/drawing/2014/main" id="{F4DDF489-6D74-44D4-BBB0-40E19673E8C5}"/>
+              </a:ext>
+            </a:extLst>
+          </p:cNvPr>
+          <p:cNvSpPr>
+            <a:spLocks noGrp="1"/>
+          </p:cNvSpPr>
+          <p:nvPr>
+            <p:ph type="body" sz="quarter" idx="10"/>
+          </p:nvPr>
+        </p:nvSpPr>
+        <p:spPr>
+          <a:xfrm>
+            <a:off x="274637" y="1212850"/>
+            <a:ext cx="12064279" cy="5078313"/>
+          </a:xfrm>
+        </p:spPr>
+        <p:txBody>
+          <a:bodyPr/>
+          <a:lstStyle/>
+          <a:p>
+            <a:r>
+              <a:rPr lang="en-US" altLang="ja-JP" sz="4800" dirty="0">
+                <a:solidFill>
+                  <a:schemeClr val="tx1"/>
+                </a:solidFill>
+              </a:rPr>
+              <a:t>Me, on twitter: </a:t>
+            </a:r>
+            <a:r>
+              <a:rPr lang="en-US" altLang="ja-JP" sz="4800" dirty="0">
+                <a:solidFill>
+                  <a:schemeClr val="tx1"/>
+                </a:solidFill>
+                <a:hlinkClick r:id="rId2"/>
+              </a:rPr>
+              <a:t>@dmakogon</a:t>
+            </a:r>
+            <a:endParaRPr lang="en-US" altLang="ja-JP" sz="4800" dirty="0">
+              <a:solidFill>
+                <a:schemeClr val="tx1"/>
+              </a:solidFill>
+            </a:endParaRPr>
+          </a:p>
+          <a:p>
+            <a:endParaRPr lang="en-US" altLang="ja-JP" sz="2400" dirty="0">
+              <a:solidFill>
+                <a:schemeClr val="tx1"/>
+              </a:solidFill>
+            </a:endParaRPr>
+          </a:p>
+          <a:p>
+            <a:r>
+              <a:rPr lang="en-US" altLang="ja-JP" sz="4800" dirty="0">
+                <a:solidFill>
+                  <a:schemeClr val="tx1"/>
+                </a:solidFill>
+              </a:rPr>
+              <a:t>Code demos:</a:t>
+            </a:r>
+          </a:p>
+          <a:p>
+            <a:r>
+              <a:rPr lang="en-US" altLang="ja-JP" sz="4800" dirty="0">
+                <a:solidFill>
+                  <a:schemeClr val="tx1"/>
+                </a:solidFill>
+                <a:hlinkClick r:id="rId3"/>
+              </a:rPr>
+              <a:t>github.com/dmakogon/cosmosdb-performance</a:t>
+            </a:r>
+            <a:endParaRPr lang="en-US" altLang="ja-JP" sz="4800" dirty="0">
+              <a:solidFill>
+                <a:schemeClr val="tx1"/>
+              </a:solidFill>
+            </a:endParaRPr>
+          </a:p>
+          <a:p>
+            <a:endParaRPr lang="en-US" altLang="ja-JP" sz="2400" b="1" dirty="0">
+              <a:solidFill>
+                <a:schemeClr val="tx1"/>
+              </a:solidFill>
+            </a:endParaRPr>
+          </a:p>
+          <a:p>
+            <a:r>
+              <a:rPr lang="en-US" altLang="ja-JP" sz="4800" dirty="0">
+                <a:solidFill>
+                  <a:schemeClr val="tx1"/>
+                </a:solidFill>
+              </a:rPr>
+              <a:t>Slides:</a:t>
+            </a:r>
+          </a:p>
+          <a:p>
+            <a:r>
+              <a:rPr lang="en-US" altLang="ja-JP" sz="4800" dirty="0" err="1">
+                <a:solidFill>
+                  <a:schemeClr val="tx1"/>
+                </a:solidFill>
+                <a:hlinkClick r:id="rId4"/>
+              </a:rPr>
+              <a:t>github.com</a:t>
+            </a:r>
+            <a:r>
+              <a:rPr lang="en-US" altLang="ja-JP" sz="4800" dirty="0">
+                <a:solidFill>
+                  <a:schemeClr val="tx1"/>
+                </a:solidFill>
+                <a:hlinkClick r:id="rId4"/>
+              </a:rPr>
+              <a:t>/</a:t>
+            </a:r>
+            <a:r>
+              <a:rPr lang="en-US" altLang="ja-JP" sz="4800" dirty="0" err="1">
+                <a:solidFill>
+                  <a:schemeClr val="tx1"/>
+                </a:solidFill>
+                <a:hlinkClick r:id="rId4"/>
+              </a:rPr>
+              <a:t>dmakogon</a:t>
+            </a:r>
+            <a:r>
+              <a:rPr lang="en-US" altLang="ja-JP" sz="4800" dirty="0">
+                <a:solidFill>
+                  <a:schemeClr val="tx1"/>
+                </a:solidFill>
+                <a:hlinkClick r:id="rId4"/>
+              </a:rPr>
+              <a:t>/decode2018</a:t>
+            </a:r>
+            <a:endParaRPr lang="en-US" altLang="ja-JP" sz="4800" dirty="0">
+              <a:solidFill>
+                <a:schemeClr val="tx1"/>
+              </a:solidFill>
+            </a:endParaRPr>
+          </a:p>
+        </p:txBody>
+      </p:sp>
+    </p:spTree>
+    <p:extLst>
+      <p:ext uri="{BB962C8B-B14F-4D97-AF65-F5344CB8AC3E}">
+        <p14:creationId xmlns:p14="http://schemas.microsoft.com/office/powerpoint/2010/main" val="54204717"/>
+      </p:ext>
+    </p:extLst>
+  </p:cSld>
+  <p:clrMapOvr>
+    <a:masterClrMapping/>
+  </p:clrMapOvr>
+  <p:transition>
+    <p:fade/>
+  </p:transition>
+</p:sld>
+</file>
+
+<file path=ppt/slides/slide28.xml><?xml version="1.0" encoding="utf-8"?>
+<p:sld xmlns:a="http://schemas.openxmlformats.org/drawingml/2006/main" xmlns:r="http://schemas.openxmlformats.org/officeDocument/2006/relationships" xmlns:p="http://schemas.openxmlformats.org/presentationml/2006/main">
+  <p:cSld>
+    <p:spTree>
+      <p:nvGrpSpPr>
+        <p:cNvPr id="1" name=""/>
+        <p:cNvGrpSpPr/>
+        <p:nvPr/>
+      </p:nvGrpSpPr>
+      <p:grpSpPr>
+        <a:xfrm>
+          <a:off x="0" y="0"/>
+          <a:ext cx="0" cy="0"/>
+          <a:chOff x="0" y="0"/>
+          <a:chExt cx="0" cy="0"/>
+        </a:xfrm>
+      </p:grpSpPr>
+    </p:spTree>
+    <p:extLst>
+      <p:ext uri="{BB962C8B-B14F-4D97-AF65-F5344CB8AC3E}">
+        <p14:creationId xmlns:p14="http://schemas.microsoft.com/office/powerpoint/2010/main" val="212067488"/>
       </p:ext>
     </p:extLst>
   </p:cSld>
@@ -17353,15 +17802,6 @@
 </file>
 
 <file path=customXml/item2.xml><?xml version="1.0" encoding="utf-8"?>
-<?mso-contentType ?>
-<FormTemplates xmlns="http://schemas.microsoft.com/sharepoint/v3/contenttype/forms">
-  <Display>DocumentLibraryForm</Display>
-  <Edit>DocumentLibraryForm</Edit>
-  <New>DocumentLibraryForm</New>
-</FormTemplates>
-</file>
-
-<file path=customXml/item3.xml><?xml version="1.0" encoding="utf-8"?>
 <ct:contentTypeSchema xmlns:ct="http://schemas.microsoft.com/office/2006/metadata/contentType" xmlns:ma="http://schemas.microsoft.com/office/2006/metadata/properties/metaAttributes" ct:_="" ma:_="" ma:contentTypeName="ドキュメント" ma:contentTypeID="0x0101003C54617C35A1074F8600DC48F6875AFF" ma:contentTypeVersion="8" ma:contentTypeDescription="新しいドキュメントを作成します。" ma:contentTypeScope="" ma:versionID="fac79be7cc4ba1b4b1457c68c52fb90c">
   <xsd:schema xmlns:xsd="http://www.w3.org/2001/XMLSchema" xmlns:xs="http://www.w3.org/2001/XMLSchema" xmlns:p="http://schemas.microsoft.com/office/2006/metadata/properties" xmlns:ns2="23ce663d-78ec-4732-ad2d-a7087832c5eb" xmlns:ns3="bc0f06ff-896c-4002-857c-088f702138e7" targetNamespace="http://schemas.microsoft.com/office/2006/metadata/properties" ma:root="true" ma:fieldsID="5c45048e6fa918e947788cf254f1e311" ns2:_="" ns3:_="">
     <xsd:import namespace="23ce663d-78ec-4732-ad2d-a7087832c5eb"/>
@@ -17550,6 +17990,15 @@
 </ct:contentTypeSchema>
 </file>
 
+<file path=customXml/item3.xml><?xml version="1.0" encoding="utf-8"?>
+<?mso-contentType ?>
+<FormTemplates xmlns="http://schemas.microsoft.com/sharepoint/v3/contenttype/forms">
+  <Display>DocumentLibraryForm</Display>
+  <Edit>DocumentLibraryForm</Edit>
+  <New>DocumentLibraryForm</New>
+</FormTemplates>
+</file>
+
 <file path=customXml/itemProps1.xml><?xml version="1.0" encoding="utf-8"?>
 <ds:datastoreItem xmlns:ds="http://schemas.openxmlformats.org/officeDocument/2006/customXml" ds:itemID="{F990F116-B58F-4255-B05B-DA3808E0E5C6}">
   <ds:schemaRefs>
@@ -17560,14 +18009,6 @@
 </file>
 
 <file path=customXml/itemProps2.xml><?xml version="1.0" encoding="utf-8"?>
-<ds:datastoreItem xmlns:ds="http://schemas.openxmlformats.org/officeDocument/2006/customXml" ds:itemID="{758FDAC0-319D-4A54-8D8E-1D42CB1F8004}">
-  <ds:schemaRefs>
-    <ds:schemaRef ds:uri="http://schemas.microsoft.com/sharepoint/v3/contenttype/forms"/>
-  </ds:schemaRefs>
-</ds:datastoreItem>
-</file>
-
-<file path=customXml/itemProps3.xml><?xml version="1.0" encoding="utf-8"?>
 <ds:datastoreItem xmlns:ds="http://schemas.openxmlformats.org/officeDocument/2006/customXml" ds:itemID="{A291E3A2-B76B-4EA1-8D40-967B196122C3}">
   <ds:schemaRefs>
     <ds:schemaRef ds:uri="http://schemas.microsoft.com/office/2006/metadata/contentType"/>
@@ -17584,4 +18025,12 @@
     <ds:schemaRef ds:uri="http://schemas.microsoft.com/internal/obd"/>
   </ds:schemaRefs>
 </ds:datastoreItem>
+</file>
+
+<file path=customXml/itemProps3.xml><?xml version="1.0" encoding="utf-8"?>
+<ds:datastoreItem xmlns:ds="http://schemas.openxmlformats.org/officeDocument/2006/customXml" ds:itemID="{758FDAC0-319D-4A54-8D8E-1D42CB1F8004}">
+  <ds:schemaRefs>
+    <ds:schemaRef ds:uri="http://schemas.microsoft.com/sharepoint/v3/contenttype/forms"/>
+  </ds:schemaRefs>
+</ds:datastoreItem>
 </file>
</xml_diff>